<commit_message>
Modifying Dimensions and Drawings
</commit_message>
<xml_diff>
--- a/Presentation/Questions.pptx
+++ b/Presentation/Questions.pptx
@@ -105,6 +105,11 @@
       </a:defRPr>
     </a:lvl9pPr>
   </p:defaultTextStyle>
+  <p:extLst>
+    <p:ext uri="{EFAFB233-063F-42B5-8137-9DF3F51BA10A}">
+      <p15:sldGuideLst xmlns:p15="http://schemas.microsoft.com/office/powerpoint/2012/main"/>
+    </p:ext>
+  </p:extLst>
 </p:presentation>
 </file>
 
@@ -255,7 +260,7 @@
           <a:p>
             <a:fld id="{36128559-110C-4B45-85B9-250D42B5F0CF}" type="datetimeFigureOut">
               <a:rPr lang="en-US" smtClean="0"/>
-              <a:t>8/4/2019</a:t>
+              <a:t>8/5/2019</a:t>
             </a:fld>
             <a:endParaRPr lang="en-US"/>
           </a:p>
@@ -453,7 +458,7 @@
           <a:p>
             <a:fld id="{36128559-110C-4B45-85B9-250D42B5F0CF}" type="datetimeFigureOut">
               <a:rPr lang="en-US" smtClean="0"/>
-              <a:t>8/4/2019</a:t>
+              <a:t>8/5/2019</a:t>
             </a:fld>
             <a:endParaRPr lang="en-US"/>
           </a:p>
@@ -661,7 +666,7 @@
           <a:p>
             <a:fld id="{36128559-110C-4B45-85B9-250D42B5F0CF}" type="datetimeFigureOut">
               <a:rPr lang="en-US" smtClean="0"/>
-              <a:t>8/4/2019</a:t>
+              <a:t>8/5/2019</a:t>
             </a:fld>
             <a:endParaRPr lang="en-US"/>
           </a:p>
@@ -859,7 +864,7 @@
           <a:p>
             <a:fld id="{36128559-110C-4B45-85B9-250D42B5F0CF}" type="datetimeFigureOut">
               <a:rPr lang="en-US" smtClean="0"/>
-              <a:t>8/4/2019</a:t>
+              <a:t>8/5/2019</a:t>
             </a:fld>
             <a:endParaRPr lang="en-US"/>
           </a:p>
@@ -1134,7 +1139,7 @@
           <a:p>
             <a:fld id="{36128559-110C-4B45-85B9-250D42B5F0CF}" type="datetimeFigureOut">
               <a:rPr lang="en-US" smtClean="0"/>
-              <a:t>8/4/2019</a:t>
+              <a:t>8/5/2019</a:t>
             </a:fld>
             <a:endParaRPr lang="en-US"/>
           </a:p>
@@ -1399,7 +1404,7 @@
           <a:p>
             <a:fld id="{36128559-110C-4B45-85B9-250D42B5F0CF}" type="datetimeFigureOut">
               <a:rPr lang="en-US" smtClean="0"/>
-              <a:t>8/4/2019</a:t>
+              <a:t>8/5/2019</a:t>
             </a:fld>
             <a:endParaRPr lang="en-US"/>
           </a:p>
@@ -1811,7 +1816,7 @@
           <a:p>
             <a:fld id="{36128559-110C-4B45-85B9-250D42B5F0CF}" type="datetimeFigureOut">
               <a:rPr lang="en-US" smtClean="0"/>
-              <a:t>8/4/2019</a:t>
+              <a:t>8/5/2019</a:t>
             </a:fld>
             <a:endParaRPr lang="en-US"/>
           </a:p>
@@ -1952,7 +1957,7 @@
           <a:p>
             <a:fld id="{36128559-110C-4B45-85B9-250D42B5F0CF}" type="datetimeFigureOut">
               <a:rPr lang="en-US" smtClean="0"/>
-              <a:t>8/4/2019</a:t>
+              <a:t>8/5/2019</a:t>
             </a:fld>
             <a:endParaRPr lang="en-US"/>
           </a:p>
@@ -2065,7 +2070,7 @@
           <a:p>
             <a:fld id="{36128559-110C-4B45-85B9-250D42B5F0CF}" type="datetimeFigureOut">
               <a:rPr lang="en-US" smtClean="0"/>
-              <a:t>8/4/2019</a:t>
+              <a:t>8/5/2019</a:t>
             </a:fld>
             <a:endParaRPr lang="en-US"/>
           </a:p>
@@ -2376,7 +2381,7 @@
           <a:p>
             <a:fld id="{36128559-110C-4B45-85B9-250D42B5F0CF}" type="datetimeFigureOut">
               <a:rPr lang="en-US" smtClean="0"/>
-              <a:t>8/4/2019</a:t>
+              <a:t>8/5/2019</a:t>
             </a:fld>
             <a:endParaRPr lang="en-US"/>
           </a:p>
@@ -2664,7 +2669,7 @@
           <a:p>
             <a:fld id="{36128559-110C-4B45-85B9-250D42B5F0CF}" type="datetimeFigureOut">
               <a:rPr lang="en-US" smtClean="0"/>
-              <a:t>8/4/2019</a:t>
+              <a:t>8/5/2019</a:t>
             </a:fld>
             <a:endParaRPr lang="en-US"/>
           </a:p>
@@ -2905,7 +2910,7 @@
           <a:p>
             <a:fld id="{36128559-110C-4B45-85B9-250D42B5F0CF}" type="datetimeFigureOut">
               <a:rPr lang="en-US" smtClean="0"/>
-              <a:t>8/4/2019</a:t>
+              <a:t>8/5/2019</a:t>
             </a:fld>
             <a:endParaRPr lang="en-US"/>
           </a:p>

</xml_diff>